<commit_message>
Update DATOS COVID Chile 2022 04 02.pptx
</commit_message>
<xml_diff>
--- a/DATOS COVID Chile 2022 04 02.pptx
+++ b/DATOS COVID Chile 2022 04 02.pptx
@@ -5,31 +5,35 @@
     <p:sldMasterId id="2147483648" r:id="rId1"/>
   </p:sldMasterIdLst>
   <p:notesMasterIdLst>
-    <p:notesMasterId r:id="rId24"/>
+    <p:notesMasterId r:id="rId28"/>
   </p:notesMasterIdLst>
   <p:sldIdLst>
     <p:sldId id="266" r:id="rId2"/>
     <p:sldId id="276" r:id="rId3"/>
     <p:sldId id="381" r:id="rId4"/>
-    <p:sldId id="275" r:id="rId5"/>
-    <p:sldId id="380" r:id="rId6"/>
-    <p:sldId id="468" r:id="rId7"/>
-    <p:sldId id="277" r:id="rId8"/>
-    <p:sldId id="449" r:id="rId9"/>
-    <p:sldId id="426" r:id="rId10"/>
-    <p:sldId id="280" r:id="rId11"/>
-    <p:sldId id="281" r:id="rId12"/>
-    <p:sldId id="417" r:id="rId13"/>
-    <p:sldId id="431" r:id="rId14"/>
-    <p:sldId id="438" r:id="rId15"/>
-    <p:sldId id="407" r:id="rId16"/>
-    <p:sldId id="288" r:id="rId17"/>
-    <p:sldId id="467" r:id="rId18"/>
-    <p:sldId id="459" r:id="rId19"/>
-    <p:sldId id="460" r:id="rId20"/>
-    <p:sldId id="300" r:id="rId21"/>
-    <p:sldId id="451" r:id="rId22"/>
-    <p:sldId id="424" r:id="rId23"/>
+    <p:sldId id="471" r:id="rId5"/>
+    <p:sldId id="275" r:id="rId6"/>
+    <p:sldId id="380" r:id="rId7"/>
+    <p:sldId id="468" r:id="rId8"/>
+    <p:sldId id="472" r:id="rId9"/>
+    <p:sldId id="277" r:id="rId10"/>
+    <p:sldId id="449" r:id="rId11"/>
+    <p:sldId id="469" r:id="rId12"/>
+    <p:sldId id="426" r:id="rId13"/>
+    <p:sldId id="280" r:id="rId14"/>
+    <p:sldId id="281" r:id="rId15"/>
+    <p:sldId id="417" r:id="rId16"/>
+    <p:sldId id="431" r:id="rId17"/>
+    <p:sldId id="438" r:id="rId18"/>
+    <p:sldId id="407" r:id="rId19"/>
+    <p:sldId id="288" r:id="rId20"/>
+    <p:sldId id="467" r:id="rId21"/>
+    <p:sldId id="459" r:id="rId22"/>
+    <p:sldId id="460" r:id="rId23"/>
+    <p:sldId id="300" r:id="rId24"/>
+    <p:sldId id="451" r:id="rId25"/>
+    <p:sldId id="470" r:id="rId26"/>
+    <p:sldId id="424" r:id="rId27"/>
   </p:sldIdLst>
   <p:sldSz cx="12192000" cy="6858000"/>
   <p:notesSz cx="6858000" cy="9144000"/>
@@ -598,7 +602,7 @@
           <a:p>
             <a:fld id="{843DCC2D-BF8E-6546-A31C-967437B0E67F}" type="slidenum">
               <a:rPr lang="en-US" smtClean="0"/>
-              <a:t>5</a:t>
+              <a:t>6</a:t>
             </a:fld>
             <a:endParaRPr lang="en-US"/>
           </a:p>
@@ -730,7 +734,7 @@
           <a:p>
             <a:fld id="{843DCC2D-BF8E-6546-A31C-967437B0E67F}" type="slidenum">
               <a:rPr lang="en-US" smtClean="0"/>
-              <a:t>6</a:t>
+              <a:t>7</a:t>
             </a:fld>
             <a:endParaRPr lang="en-US"/>
           </a:p>
@@ -795,26 +799,19 @@
           <a:p>
             <a:r>
               <a:rPr lang="en-US" dirty="0"/>
-              <a:t>OMS</a:t>
-            </a:r>
-            <a:br>
-              <a:rPr lang="en-US" dirty="0"/>
-            </a:br>
-            <a:r>
-              <a:rPr lang="en-US" dirty="0"/>
-              <a:t>Baja </a:t>
+              <a:t>OMS: </a:t>
             </a:r>
             <a:r>
               <a:rPr lang="en-US" dirty="0" err="1"/>
-              <a:t>sostenida</a:t>
-            </a:r>
-            <a:r>
-              <a:rPr lang="en-US" dirty="0"/>
-              <a:t> (reducer a la </a:t>
+              <a:t>reducción</a:t>
+            </a:r>
+            <a:r>
+              <a:rPr lang="en-US" dirty="0"/>
+              <a:t> de </a:t>
             </a:r>
             <a:r>
               <a:rPr lang="en-US" dirty="0" err="1"/>
-              <a:t>mitad</a:t>
+              <a:t>fallecidmidos</a:t>
             </a:r>
             <a:r>
               <a:rPr lang="en-US" dirty="0"/>
@@ -822,7 +819,23 @@
             </a:r>
             <a:r>
               <a:rPr lang="en-US" dirty="0" err="1"/>
-              <a:t>en</a:t>
+              <a:t>confirmados</a:t>
+            </a:r>
+            <a:r>
+              <a:rPr lang="en-US" dirty="0"/>
+              <a:t> y </a:t>
+            </a:r>
+            <a:r>
+              <a:rPr lang="en-US" dirty="0" err="1"/>
+              <a:t>probables</a:t>
+            </a:r>
+            <a:r>
+              <a:rPr lang="en-US" dirty="0"/>
+              <a:t> </a:t>
+            </a:r>
+            <a:r>
+              <a:rPr lang="en-US" dirty="0" err="1"/>
+              <a:t>por</a:t>
             </a:r>
             <a:r>
               <a:rPr lang="en-US" dirty="0"/>
@@ -832,55 +845,6 @@
               <a:rPr lang="en-US" dirty="0" err="1"/>
               <a:t>semanas</a:t>
             </a:r>
-            <a:r>
-              <a:rPr lang="en-US" dirty="0"/>
-              <a:t>”</a:t>
-            </a:r>
-          </a:p>
-          <a:p>
-            <a:endParaRPr lang="en-US" dirty="0"/>
-          </a:p>
-          <a:p>
-            <a:r>
-              <a:rPr lang="en-US" dirty="0"/>
-              <a:t>UK:</a:t>
-            </a:r>
-            <a:br>
-              <a:rPr lang="en-US" dirty="0"/>
-            </a:br>
-            <a:r>
-              <a:rPr lang="en-US" dirty="0"/>
-              <a:t>Bajo 14 para </a:t>
-            </a:r>
-            <a:r>
-              <a:rPr lang="en-US" dirty="0" err="1"/>
-              <a:t>abrir</a:t>
-            </a:r>
-            <a:r>
-              <a:rPr lang="en-US" dirty="0"/>
-              <a:t> </a:t>
-            </a:r>
-            <a:r>
-              <a:rPr lang="en-US" dirty="0" err="1"/>
-              <a:t>escuelas</a:t>
-            </a:r>
-            <a:endParaRPr lang="en-US" dirty="0"/>
-          </a:p>
-          <a:p>
-            <a:r>
-              <a:rPr lang="en-US" dirty="0"/>
-              <a:t>Bajo 1,4 para </a:t>
-            </a:r>
-            <a:r>
-              <a:rPr lang="en-US" dirty="0" err="1"/>
-              <a:t>abrir</a:t>
-            </a:r>
-            <a:r>
-              <a:rPr lang="en-US" dirty="0"/>
-              <a:t> el resto</a:t>
-            </a:r>
-          </a:p>
-          <a:p>
             <a:endParaRPr lang="en-US" dirty="0"/>
           </a:p>
         </p:txBody>
@@ -911,7 +875,7 @@
     </p:spTree>
     <p:extLst>
       <p:ext uri="{BB962C8B-B14F-4D97-AF65-F5344CB8AC3E}">
-        <p14:creationId xmlns:p14="http://schemas.microsoft.com/office/powerpoint/2010/main" val="690823015"/>
+        <p14:creationId xmlns:p14="http://schemas.microsoft.com/office/powerpoint/2010/main" val="2679176977"/>
       </p:ext>
     </p:extLst>
   </p:cSld>
@@ -1074,7 +1038,7 @@
           <a:p>
             <a:fld id="{843DCC2D-BF8E-6546-A31C-967437B0E67F}" type="slidenum">
               <a:rPr lang="en-US" smtClean="0"/>
-              <a:t>9</a:t>
+              <a:t>10</a:t>
             </a:fld>
             <a:endParaRPr lang="en-US"/>
           </a:p>
@@ -1083,7 +1047,7 @@
     </p:spTree>
     <p:extLst>
       <p:ext uri="{BB962C8B-B14F-4D97-AF65-F5344CB8AC3E}">
-        <p14:creationId xmlns:p14="http://schemas.microsoft.com/office/powerpoint/2010/main" val="1540371733"/>
+        <p14:creationId xmlns:p14="http://schemas.microsoft.com/office/powerpoint/2010/main" val="690823015"/>
       </p:ext>
     </p:extLst>
   </p:cSld>
@@ -1139,15 +1103,30 @@
           <a:p>
             <a:r>
               <a:rPr lang="en-US" dirty="0"/>
-              <a:t>OMS: </a:t>
+              <a:t>OMS</a:t>
+            </a:r>
+            <a:br>
+              <a:rPr lang="en-US" dirty="0"/>
+            </a:br>
+            <a:r>
+              <a:rPr lang="en-US" dirty="0"/>
+              <a:t>Baja </a:t>
             </a:r>
             <a:r>
               <a:rPr lang="en-US" dirty="0" err="1"/>
-              <a:t>Menor</a:t>
-            </a:r>
-            <a:r>
-              <a:rPr lang="en-US" dirty="0"/>
-              <a:t> a 5% </a:t>
+              <a:t>sostenida</a:t>
+            </a:r>
+            <a:r>
+              <a:rPr lang="en-US" dirty="0"/>
+              <a:t> (reducer a la </a:t>
+            </a:r>
+            <a:r>
+              <a:rPr lang="en-US" dirty="0" err="1"/>
+              <a:t>mitad</a:t>
+            </a:r>
+            <a:r>
+              <a:rPr lang="en-US" dirty="0"/>
+              <a:t> </a:t>
             </a:r>
             <a:r>
               <a:rPr lang="en-US" dirty="0" err="1"/>
@@ -1155,20 +1134,61 @@
             </a:r>
             <a:r>
               <a:rPr lang="en-US" dirty="0"/>
-              <a:t> </a:t>
-            </a:r>
-            <a:r>
-              <a:rPr lang="en-US" dirty="0" err="1"/>
-              <a:t>últimas</a:t>
-            </a:r>
-            <a:r>
-              <a:rPr lang="en-US" dirty="0"/>
-              <a:t> 2 </a:t>
+              <a:t> 3 </a:t>
             </a:r>
             <a:r>
               <a:rPr lang="en-US" dirty="0" err="1"/>
               <a:t>semanas</a:t>
             </a:r>
+            <a:r>
+              <a:rPr lang="en-US" dirty="0"/>
+              <a:t>”</a:t>
+            </a:r>
+          </a:p>
+          <a:p>
+            <a:endParaRPr lang="en-US" dirty="0"/>
+          </a:p>
+          <a:p>
+            <a:r>
+              <a:rPr lang="en-US" dirty="0"/>
+              <a:t>UK:</a:t>
+            </a:r>
+            <a:br>
+              <a:rPr lang="en-US" dirty="0"/>
+            </a:br>
+            <a:r>
+              <a:rPr lang="en-US" dirty="0"/>
+              <a:t>Bajo 14 para </a:t>
+            </a:r>
+            <a:r>
+              <a:rPr lang="en-US" dirty="0" err="1"/>
+              <a:t>abrir</a:t>
+            </a:r>
+            <a:r>
+              <a:rPr lang="en-US" dirty="0"/>
+              <a:t> </a:t>
+            </a:r>
+            <a:r>
+              <a:rPr lang="en-US" dirty="0" err="1"/>
+              <a:t>escuelas</a:t>
+            </a:r>
+            <a:endParaRPr lang="en-US" dirty="0"/>
+          </a:p>
+          <a:p>
+            <a:r>
+              <a:rPr lang="en-US" dirty="0"/>
+              <a:t>Bajo 1,4 para </a:t>
+            </a:r>
+            <a:r>
+              <a:rPr lang="en-US" dirty="0" err="1"/>
+              <a:t>abrir</a:t>
+            </a:r>
+            <a:r>
+              <a:rPr lang="en-US" dirty="0"/>
+              <a:t> el resto</a:t>
+            </a:r>
+          </a:p>
+          <a:p>
             <a:endParaRPr lang="en-US" dirty="0"/>
           </a:p>
         </p:txBody>
@@ -1199,7 +1219,7 @@
     </p:spTree>
     <p:extLst>
       <p:ext uri="{BB962C8B-B14F-4D97-AF65-F5344CB8AC3E}">
-        <p14:creationId xmlns:p14="http://schemas.microsoft.com/office/powerpoint/2010/main" val="4163690373"/>
+        <p14:creationId xmlns:p14="http://schemas.microsoft.com/office/powerpoint/2010/main" val="3218521512"/>
       </p:ext>
     </p:extLst>
   </p:cSld>
@@ -1255,15 +1275,30 @@
           <a:p>
             <a:r>
               <a:rPr lang="en-US" dirty="0"/>
-              <a:t>OMS: </a:t>
+              <a:t>OMS</a:t>
+            </a:r>
+            <a:br>
+              <a:rPr lang="en-US" dirty="0"/>
+            </a:br>
+            <a:r>
+              <a:rPr lang="en-US" dirty="0"/>
+              <a:t>Baja </a:t>
             </a:r>
             <a:r>
               <a:rPr lang="en-US" dirty="0" err="1"/>
-              <a:t>Menor</a:t>
-            </a:r>
-            <a:r>
-              <a:rPr lang="en-US" dirty="0"/>
-              <a:t> a 5% </a:t>
+              <a:t>sostenida</a:t>
+            </a:r>
+            <a:r>
+              <a:rPr lang="en-US" dirty="0"/>
+              <a:t> (reducer a la </a:t>
+            </a:r>
+            <a:r>
+              <a:rPr lang="en-US" dirty="0" err="1"/>
+              <a:t>mitad</a:t>
+            </a:r>
+            <a:r>
+              <a:rPr lang="en-US" dirty="0"/>
+              <a:t> </a:t>
             </a:r>
             <a:r>
               <a:rPr lang="en-US" dirty="0" err="1"/>
@@ -1271,20 +1306,61 @@
             </a:r>
             <a:r>
               <a:rPr lang="en-US" dirty="0"/>
-              <a:t> </a:t>
-            </a:r>
-            <a:r>
-              <a:rPr lang="en-US" dirty="0" err="1"/>
-              <a:t>últimas</a:t>
-            </a:r>
-            <a:r>
-              <a:rPr lang="en-US" dirty="0"/>
-              <a:t> 2 </a:t>
+              <a:t> 3 </a:t>
             </a:r>
             <a:r>
               <a:rPr lang="en-US" dirty="0" err="1"/>
               <a:t>semanas</a:t>
             </a:r>
+            <a:r>
+              <a:rPr lang="en-US" dirty="0"/>
+              <a:t>”</a:t>
+            </a:r>
+          </a:p>
+          <a:p>
+            <a:endParaRPr lang="en-US" dirty="0"/>
+          </a:p>
+          <a:p>
+            <a:r>
+              <a:rPr lang="en-US" dirty="0"/>
+              <a:t>UK:</a:t>
+            </a:r>
+            <a:br>
+              <a:rPr lang="en-US" dirty="0"/>
+            </a:br>
+            <a:r>
+              <a:rPr lang="en-US" dirty="0"/>
+              <a:t>Bajo 14 para </a:t>
+            </a:r>
+            <a:r>
+              <a:rPr lang="en-US" dirty="0" err="1"/>
+              <a:t>abrir</a:t>
+            </a:r>
+            <a:r>
+              <a:rPr lang="en-US" dirty="0"/>
+              <a:t> </a:t>
+            </a:r>
+            <a:r>
+              <a:rPr lang="en-US" dirty="0" err="1"/>
+              <a:t>escuelas</a:t>
+            </a:r>
+            <a:endParaRPr lang="en-US" dirty="0"/>
+          </a:p>
+          <a:p>
+            <a:r>
+              <a:rPr lang="en-US" dirty="0"/>
+              <a:t>Bajo 1,4 para </a:t>
+            </a:r>
+            <a:r>
+              <a:rPr lang="en-US" dirty="0" err="1"/>
+              <a:t>abrir</a:t>
+            </a:r>
+            <a:r>
+              <a:rPr lang="en-US" dirty="0"/>
+              <a:t> el resto</a:t>
+            </a:r>
+          </a:p>
+          <a:p>
             <a:endParaRPr lang="en-US" dirty="0"/>
           </a:p>
         </p:txBody>
@@ -1307,6 +1383,238 @@
             <a:fld id="{843DCC2D-BF8E-6546-A31C-967437B0E67F}" type="slidenum">
               <a:rPr lang="en-US" smtClean="0"/>
               <a:t>12</a:t>
+            </a:fld>
+            <a:endParaRPr lang="en-US"/>
+          </a:p>
+        </p:txBody>
+      </p:sp>
+    </p:spTree>
+    <p:extLst>
+      <p:ext uri="{BB962C8B-B14F-4D97-AF65-F5344CB8AC3E}">
+        <p14:creationId xmlns:p14="http://schemas.microsoft.com/office/powerpoint/2010/main" val="1540371733"/>
+      </p:ext>
+    </p:extLst>
+  </p:cSld>
+  <p:clrMapOvr>
+    <a:masterClrMapping/>
+  </p:clrMapOvr>
+</p:notes>
+</file>
+
+<file path=ppt/notesSlides/notesSlide7.xml><?xml version="1.0" encoding="utf-8"?>
+<p:notes xmlns:a="http://schemas.openxmlformats.org/drawingml/2006/main" xmlns:r="http://schemas.openxmlformats.org/officeDocument/2006/relationships" xmlns:p="http://schemas.openxmlformats.org/presentationml/2006/main">
+  <p:cSld>
+    <p:spTree>
+      <p:nvGrpSpPr>
+        <p:cNvPr id="1" name=""/>
+        <p:cNvGrpSpPr/>
+        <p:nvPr/>
+      </p:nvGrpSpPr>
+      <p:grpSpPr>
+        <a:xfrm>
+          <a:off x="0" y="0"/>
+          <a:ext cx="0" cy="0"/>
+          <a:chOff x="0" y="0"/>
+          <a:chExt cx="0" cy="0"/>
+        </a:xfrm>
+      </p:grpSpPr>
+      <p:sp>
+        <p:nvSpPr>
+          <p:cNvPr id="2" name="Slide Image Placeholder 1"/>
+          <p:cNvSpPr>
+            <a:spLocks noGrp="1" noRot="1" noChangeAspect="1"/>
+          </p:cNvSpPr>
+          <p:nvPr>
+            <p:ph type="sldImg"/>
+          </p:nvPr>
+        </p:nvSpPr>
+        <p:spPr/>
+      </p:sp>
+      <p:sp>
+        <p:nvSpPr>
+          <p:cNvPr id="3" name="Notes Placeholder 2"/>
+          <p:cNvSpPr>
+            <a:spLocks noGrp="1"/>
+          </p:cNvSpPr>
+          <p:nvPr>
+            <p:ph type="body" idx="1"/>
+          </p:nvPr>
+        </p:nvSpPr>
+        <p:spPr/>
+        <p:txBody>
+          <a:bodyPr/>
+          <a:lstStyle/>
+          <a:p>
+            <a:r>
+              <a:rPr lang="en-US" dirty="0"/>
+              <a:t>OMS: </a:t>
+            </a:r>
+            <a:r>
+              <a:rPr lang="en-US" dirty="0" err="1"/>
+              <a:t>Menor</a:t>
+            </a:r>
+            <a:r>
+              <a:rPr lang="en-US" dirty="0"/>
+              <a:t> a 5% </a:t>
+            </a:r>
+            <a:r>
+              <a:rPr lang="en-US" dirty="0" err="1"/>
+              <a:t>en</a:t>
+            </a:r>
+            <a:r>
+              <a:rPr lang="en-US" dirty="0"/>
+              <a:t> </a:t>
+            </a:r>
+            <a:r>
+              <a:rPr lang="en-US" dirty="0" err="1"/>
+              <a:t>últimas</a:t>
+            </a:r>
+            <a:r>
+              <a:rPr lang="en-US" dirty="0"/>
+              <a:t> 2 </a:t>
+            </a:r>
+            <a:r>
+              <a:rPr lang="en-US" dirty="0" err="1"/>
+              <a:t>semanas</a:t>
+            </a:r>
+            <a:endParaRPr lang="en-US" dirty="0"/>
+          </a:p>
+        </p:txBody>
+      </p:sp>
+      <p:sp>
+        <p:nvSpPr>
+          <p:cNvPr id="4" name="Slide Number Placeholder 3"/>
+          <p:cNvSpPr>
+            <a:spLocks noGrp="1"/>
+          </p:cNvSpPr>
+          <p:nvPr>
+            <p:ph type="sldNum" sz="quarter" idx="5"/>
+          </p:nvPr>
+        </p:nvSpPr>
+        <p:spPr/>
+        <p:txBody>
+          <a:bodyPr/>
+          <a:lstStyle/>
+          <a:p>
+            <a:fld id="{843DCC2D-BF8E-6546-A31C-967437B0E67F}" type="slidenum">
+              <a:rPr lang="en-US" smtClean="0"/>
+              <a:t>14</a:t>
+            </a:fld>
+            <a:endParaRPr lang="en-US"/>
+          </a:p>
+        </p:txBody>
+      </p:sp>
+    </p:spTree>
+    <p:extLst>
+      <p:ext uri="{BB962C8B-B14F-4D97-AF65-F5344CB8AC3E}">
+        <p14:creationId xmlns:p14="http://schemas.microsoft.com/office/powerpoint/2010/main" val="4163690373"/>
+      </p:ext>
+    </p:extLst>
+  </p:cSld>
+  <p:clrMapOvr>
+    <a:masterClrMapping/>
+  </p:clrMapOvr>
+</p:notes>
+</file>
+
+<file path=ppt/notesSlides/notesSlide8.xml><?xml version="1.0" encoding="utf-8"?>
+<p:notes xmlns:a="http://schemas.openxmlformats.org/drawingml/2006/main" xmlns:r="http://schemas.openxmlformats.org/officeDocument/2006/relationships" xmlns:p="http://schemas.openxmlformats.org/presentationml/2006/main">
+  <p:cSld>
+    <p:spTree>
+      <p:nvGrpSpPr>
+        <p:cNvPr id="1" name=""/>
+        <p:cNvGrpSpPr/>
+        <p:nvPr/>
+      </p:nvGrpSpPr>
+      <p:grpSpPr>
+        <a:xfrm>
+          <a:off x="0" y="0"/>
+          <a:ext cx="0" cy="0"/>
+          <a:chOff x="0" y="0"/>
+          <a:chExt cx="0" cy="0"/>
+        </a:xfrm>
+      </p:grpSpPr>
+      <p:sp>
+        <p:nvSpPr>
+          <p:cNvPr id="2" name="Slide Image Placeholder 1"/>
+          <p:cNvSpPr>
+            <a:spLocks noGrp="1" noRot="1" noChangeAspect="1"/>
+          </p:cNvSpPr>
+          <p:nvPr>
+            <p:ph type="sldImg"/>
+          </p:nvPr>
+        </p:nvSpPr>
+        <p:spPr/>
+      </p:sp>
+      <p:sp>
+        <p:nvSpPr>
+          <p:cNvPr id="3" name="Notes Placeholder 2"/>
+          <p:cNvSpPr>
+            <a:spLocks noGrp="1"/>
+          </p:cNvSpPr>
+          <p:nvPr>
+            <p:ph type="body" idx="1"/>
+          </p:nvPr>
+        </p:nvSpPr>
+        <p:spPr/>
+        <p:txBody>
+          <a:bodyPr/>
+          <a:lstStyle/>
+          <a:p>
+            <a:r>
+              <a:rPr lang="en-US" dirty="0"/>
+              <a:t>OMS: </a:t>
+            </a:r>
+            <a:r>
+              <a:rPr lang="en-US" dirty="0" err="1"/>
+              <a:t>Menor</a:t>
+            </a:r>
+            <a:r>
+              <a:rPr lang="en-US" dirty="0"/>
+              <a:t> a 5% </a:t>
+            </a:r>
+            <a:r>
+              <a:rPr lang="en-US" dirty="0" err="1"/>
+              <a:t>en</a:t>
+            </a:r>
+            <a:r>
+              <a:rPr lang="en-US" dirty="0"/>
+              <a:t> </a:t>
+            </a:r>
+            <a:r>
+              <a:rPr lang="en-US" dirty="0" err="1"/>
+              <a:t>últimas</a:t>
+            </a:r>
+            <a:r>
+              <a:rPr lang="en-US" dirty="0"/>
+              <a:t> 2 </a:t>
+            </a:r>
+            <a:r>
+              <a:rPr lang="en-US" dirty="0" err="1"/>
+              <a:t>semanas</a:t>
+            </a:r>
+            <a:endParaRPr lang="en-US" dirty="0"/>
+          </a:p>
+        </p:txBody>
+      </p:sp>
+      <p:sp>
+        <p:nvSpPr>
+          <p:cNvPr id="4" name="Slide Number Placeholder 3"/>
+          <p:cNvSpPr>
+            <a:spLocks noGrp="1"/>
+          </p:cNvSpPr>
+          <p:nvPr>
+            <p:ph type="sldNum" sz="quarter" idx="5"/>
+          </p:nvPr>
+        </p:nvSpPr>
+        <p:spPr/>
+        <p:txBody>
+          <a:bodyPr/>
+          <a:lstStyle/>
+          <a:p>
+            <a:fld id="{843DCC2D-BF8E-6546-A31C-967437B0E67F}" type="slidenum">
+              <a:rPr lang="en-US" smtClean="0"/>
+              <a:t>15</a:t>
             </a:fld>
             <a:endParaRPr lang="en-US"/>
           </a:p>
@@ -4765,6 +5073,415 @@
       </p:grpSpPr>
       <p:sp>
         <p:nvSpPr>
+          <p:cNvPr id="6" name="TextBox 5">
+            <a:extLst>
+              <a:ext uri="{FF2B5EF4-FFF2-40B4-BE49-F238E27FC236}">
+                <a16:creationId xmlns:a16="http://schemas.microsoft.com/office/drawing/2014/main" id="{AB65407A-4582-004A-A45F-BD87B99ABAF2}"/>
+              </a:ext>
+            </a:extLst>
+          </p:cNvPr>
+          <p:cNvSpPr txBox="1"/>
+          <p:nvPr/>
+        </p:nvSpPr>
+        <p:spPr>
+          <a:xfrm>
+            <a:off x="2627010" y="128200"/>
+            <a:ext cx="6937980" cy="584775"/>
+          </a:xfrm>
+          <a:prstGeom prst="rect">
+            <a:avLst/>
+          </a:prstGeom>
+          <a:solidFill>
+            <a:schemeClr val="bg1"/>
+          </a:solidFill>
+        </p:spPr>
+        <p:txBody>
+          <a:bodyPr wrap="square" rtlCol="0">
+            <a:spAutoFit/>
+          </a:bodyPr>
+          <a:lstStyle/>
+          <a:p>
+            <a:pPr algn="ctr"/>
+            <a:r>
+              <a:rPr lang="en-US" sz="3200" dirty="0"/>
+              <a:t>CASOS CONFIRMADOS POR SEMANA </a:t>
+            </a:r>
+          </a:p>
+        </p:txBody>
+      </p:sp>
+      <p:pic>
+        <p:nvPicPr>
+          <p:cNvPr id="2" name="Picture 1">
+            <a:extLst>
+              <a:ext uri="{FF2B5EF4-FFF2-40B4-BE49-F238E27FC236}">
+                <a16:creationId xmlns:a16="http://schemas.microsoft.com/office/drawing/2014/main" id="{295007A5-62C2-A945-856A-B7C50031EDE8}"/>
+              </a:ext>
+            </a:extLst>
+          </p:cNvPr>
+          <p:cNvPicPr>
+            <a:picLocks noChangeAspect="1"/>
+          </p:cNvPicPr>
+          <p:nvPr/>
+        </p:nvPicPr>
+        <p:blipFill>
+          <a:blip r:embed="rId3"/>
+          <a:stretch>
+            <a:fillRect/>
+          </a:stretch>
+        </p:blipFill>
+        <p:spPr>
+          <a:xfrm>
+            <a:off x="2285474" y="712975"/>
+            <a:ext cx="7621052" cy="5656472"/>
+          </a:xfrm>
+          <a:prstGeom prst="rect">
+            <a:avLst/>
+          </a:prstGeom>
+        </p:spPr>
+      </p:pic>
+    </p:spTree>
+    <p:extLst>
+      <p:ext uri="{BB962C8B-B14F-4D97-AF65-F5344CB8AC3E}">
+        <p14:creationId xmlns:p14="http://schemas.microsoft.com/office/powerpoint/2010/main" val="2803636919"/>
+      </p:ext>
+    </p:extLst>
+  </p:cSld>
+  <p:clrMapOvr>
+    <a:masterClrMapping/>
+  </p:clrMapOvr>
+</p:sld>
+</file>
+
+<file path=ppt/slides/slide11.xml><?xml version="1.0" encoding="utf-8"?>
+<p:sld xmlns:a="http://schemas.openxmlformats.org/drawingml/2006/main" xmlns:r="http://schemas.openxmlformats.org/officeDocument/2006/relationships" xmlns:p="http://schemas.openxmlformats.org/presentationml/2006/main">
+  <p:cSld>
+    <p:spTree>
+      <p:nvGrpSpPr>
+        <p:cNvPr id="1" name=""/>
+        <p:cNvGrpSpPr/>
+        <p:nvPr/>
+      </p:nvGrpSpPr>
+      <p:grpSpPr>
+        <a:xfrm>
+          <a:off x="0" y="0"/>
+          <a:ext cx="0" cy="0"/>
+          <a:chOff x="0" y="0"/>
+          <a:chExt cx="0" cy="0"/>
+        </a:xfrm>
+      </p:grpSpPr>
+      <p:sp>
+        <p:nvSpPr>
+          <p:cNvPr id="6" name="TextBox 5">
+            <a:extLst>
+              <a:ext uri="{FF2B5EF4-FFF2-40B4-BE49-F238E27FC236}">
+                <a16:creationId xmlns:a16="http://schemas.microsoft.com/office/drawing/2014/main" id="{AB65407A-4582-004A-A45F-BD87B99ABAF2}"/>
+              </a:ext>
+            </a:extLst>
+          </p:cNvPr>
+          <p:cNvSpPr txBox="1"/>
+          <p:nvPr/>
+        </p:nvSpPr>
+        <p:spPr>
+          <a:xfrm>
+            <a:off x="2627010" y="128200"/>
+            <a:ext cx="6937980" cy="584775"/>
+          </a:xfrm>
+          <a:prstGeom prst="rect">
+            <a:avLst/>
+          </a:prstGeom>
+          <a:solidFill>
+            <a:schemeClr val="bg1"/>
+          </a:solidFill>
+        </p:spPr>
+        <p:txBody>
+          <a:bodyPr wrap="square" rtlCol="0">
+            <a:spAutoFit/>
+          </a:bodyPr>
+          <a:lstStyle/>
+          <a:p>
+            <a:pPr algn="ctr"/>
+            <a:r>
+              <a:rPr lang="en-US" sz="3200" dirty="0"/>
+              <a:t>CASOS CONFIRMADOS POR SEMANA </a:t>
+            </a:r>
+          </a:p>
+        </p:txBody>
+      </p:sp>
+      <p:pic>
+        <p:nvPicPr>
+          <p:cNvPr id="3" name="Picture 2">
+            <a:extLst>
+              <a:ext uri="{FF2B5EF4-FFF2-40B4-BE49-F238E27FC236}">
+                <a16:creationId xmlns:a16="http://schemas.microsoft.com/office/drawing/2014/main" id="{106B7C35-205E-C34A-8360-ECD133C8B0DE}"/>
+              </a:ext>
+            </a:extLst>
+          </p:cNvPr>
+          <p:cNvPicPr>
+            <a:picLocks noChangeAspect="1"/>
+          </p:cNvPicPr>
+          <p:nvPr/>
+        </p:nvPicPr>
+        <p:blipFill>
+          <a:blip r:embed="rId3"/>
+          <a:stretch>
+            <a:fillRect/>
+          </a:stretch>
+        </p:blipFill>
+        <p:spPr>
+          <a:xfrm>
+            <a:off x="2244349" y="712975"/>
+            <a:ext cx="7703302" cy="5722994"/>
+          </a:xfrm>
+          <a:prstGeom prst="rect">
+            <a:avLst/>
+          </a:prstGeom>
+        </p:spPr>
+      </p:pic>
+    </p:spTree>
+    <p:extLst>
+      <p:ext uri="{BB962C8B-B14F-4D97-AF65-F5344CB8AC3E}">
+        <p14:creationId xmlns:p14="http://schemas.microsoft.com/office/powerpoint/2010/main" val="3359114157"/>
+      </p:ext>
+    </p:extLst>
+  </p:cSld>
+  <p:clrMapOvr>
+    <a:masterClrMapping/>
+  </p:clrMapOvr>
+</p:sld>
+</file>
+
+<file path=ppt/slides/slide12.xml><?xml version="1.0" encoding="utf-8"?>
+<p:sld xmlns:a="http://schemas.openxmlformats.org/drawingml/2006/main" xmlns:r="http://schemas.openxmlformats.org/officeDocument/2006/relationships" xmlns:p="http://schemas.openxmlformats.org/presentationml/2006/main">
+  <p:cSld>
+    <p:spTree>
+      <p:nvGrpSpPr>
+        <p:cNvPr id="1" name=""/>
+        <p:cNvGrpSpPr/>
+        <p:nvPr/>
+      </p:nvGrpSpPr>
+      <p:grpSpPr>
+        <a:xfrm>
+          <a:off x="0" y="0"/>
+          <a:ext cx="0" cy="0"/>
+          <a:chOff x="0" y="0"/>
+          <a:chExt cx="0" cy="0"/>
+        </a:xfrm>
+      </p:grpSpPr>
+      <p:sp>
+        <p:nvSpPr>
+          <p:cNvPr id="6" name="TextBox 5">
+            <a:extLst>
+              <a:ext uri="{FF2B5EF4-FFF2-40B4-BE49-F238E27FC236}">
+                <a16:creationId xmlns:a16="http://schemas.microsoft.com/office/drawing/2014/main" id="{AB65407A-4582-004A-A45F-BD87B99ABAF2}"/>
+              </a:ext>
+            </a:extLst>
+          </p:cNvPr>
+          <p:cNvSpPr txBox="1"/>
+          <p:nvPr/>
+        </p:nvSpPr>
+        <p:spPr>
+          <a:xfrm>
+            <a:off x="188534" y="128200"/>
+            <a:ext cx="6068989" cy="1323439"/>
+          </a:xfrm>
+          <a:prstGeom prst="rect">
+            <a:avLst/>
+          </a:prstGeom>
+          <a:solidFill>
+            <a:schemeClr val="bg1"/>
+          </a:solidFill>
+        </p:spPr>
+        <p:txBody>
+          <a:bodyPr wrap="square" rtlCol="0">
+            <a:spAutoFit/>
+          </a:bodyPr>
+          <a:lstStyle/>
+          <a:p>
+            <a:pPr algn="ctr"/>
+            <a:r>
+              <a:rPr lang="en-US" sz="3200" dirty="0"/>
+              <a:t>INCIDENCIA </a:t>
+            </a:r>
+          </a:p>
+          <a:p>
+            <a:pPr algn="ctr"/>
+            <a:r>
+              <a:rPr lang="en-US" sz="2400" dirty="0" err="1"/>
+              <a:t>Promedio</a:t>
+            </a:r>
+            <a:r>
+              <a:rPr lang="en-US" sz="2400" dirty="0"/>
+              <a:t> </a:t>
+            </a:r>
+            <a:r>
+              <a:rPr lang="en-US" sz="2400" dirty="0" err="1"/>
+              <a:t>casos</a:t>
+            </a:r>
+            <a:r>
+              <a:rPr lang="en-US" sz="2400" dirty="0"/>
+              <a:t> </a:t>
+            </a:r>
+            <a:r>
+              <a:rPr lang="en-US" sz="2400" dirty="0" err="1"/>
+              <a:t>confirmados</a:t>
+            </a:r>
+            <a:r>
+              <a:rPr lang="en-US" sz="2400" dirty="0"/>
+              <a:t> </a:t>
+            </a:r>
+            <a:r>
+              <a:rPr lang="en-US" sz="2400" dirty="0" err="1"/>
+              <a:t>diarios</a:t>
+            </a:r>
+            <a:r>
+              <a:rPr lang="en-US" sz="2400" dirty="0"/>
+              <a:t> </a:t>
+            </a:r>
+          </a:p>
+          <a:p>
+            <a:pPr algn="ctr"/>
+            <a:r>
+              <a:rPr lang="en-US" sz="2400" dirty="0"/>
+              <a:t>x 100 mil </a:t>
+            </a:r>
+            <a:r>
+              <a:rPr lang="en-US" sz="2400" dirty="0" err="1"/>
+              <a:t>habitantes</a:t>
+            </a:r>
+            <a:endParaRPr lang="en-US" sz="2400" dirty="0"/>
+          </a:p>
+        </p:txBody>
+      </p:sp>
+      <p:sp>
+        <p:nvSpPr>
+          <p:cNvPr id="11" name="TextBox 10">
+            <a:extLst>
+              <a:ext uri="{FF2B5EF4-FFF2-40B4-BE49-F238E27FC236}">
+                <a16:creationId xmlns:a16="http://schemas.microsoft.com/office/drawing/2014/main" id="{0AA3CF90-3BBE-F041-B74C-D680E845FFBE}"/>
+              </a:ext>
+            </a:extLst>
+          </p:cNvPr>
+          <p:cNvSpPr txBox="1"/>
+          <p:nvPr/>
+        </p:nvSpPr>
+        <p:spPr>
+          <a:xfrm>
+            <a:off x="6257523" y="128200"/>
+            <a:ext cx="5785995" cy="584775"/>
+          </a:xfrm>
+          <a:prstGeom prst="rect">
+            <a:avLst/>
+          </a:prstGeom>
+          <a:solidFill>
+            <a:schemeClr val="bg1"/>
+          </a:solidFill>
+        </p:spPr>
+        <p:txBody>
+          <a:bodyPr wrap="square" rtlCol="0">
+            <a:spAutoFit/>
+          </a:bodyPr>
+          <a:lstStyle/>
+          <a:p>
+            <a:pPr algn="ctr"/>
+            <a:r>
+              <a:rPr lang="en-US" sz="3200" dirty="0"/>
+              <a:t>TESTS PCR SEMANALES </a:t>
+            </a:r>
+          </a:p>
+        </p:txBody>
+      </p:sp>
+      <p:pic>
+        <p:nvPicPr>
+          <p:cNvPr id="4" name="Picture 3">
+            <a:extLst>
+              <a:ext uri="{FF2B5EF4-FFF2-40B4-BE49-F238E27FC236}">
+                <a16:creationId xmlns:a16="http://schemas.microsoft.com/office/drawing/2014/main" id="{D07D96FC-86A3-FF4E-8725-F0EE0718618C}"/>
+              </a:ext>
+            </a:extLst>
+          </p:cNvPr>
+          <p:cNvPicPr>
+            <a:picLocks noChangeAspect="1"/>
+          </p:cNvPicPr>
+          <p:nvPr/>
+        </p:nvPicPr>
+        <p:blipFill>
+          <a:blip r:embed="rId3"/>
+          <a:stretch>
+            <a:fillRect/>
+          </a:stretch>
+        </p:blipFill>
+        <p:spPr>
+          <a:xfrm>
+            <a:off x="151161" y="1600046"/>
+            <a:ext cx="5963621" cy="4443046"/>
+          </a:xfrm>
+          <a:prstGeom prst="rect">
+            <a:avLst/>
+          </a:prstGeom>
+        </p:spPr>
+      </p:pic>
+      <p:pic>
+        <p:nvPicPr>
+          <p:cNvPr id="5" name="Picture 4">
+            <a:extLst>
+              <a:ext uri="{FF2B5EF4-FFF2-40B4-BE49-F238E27FC236}">
+                <a16:creationId xmlns:a16="http://schemas.microsoft.com/office/drawing/2014/main" id="{70A81271-5FAE-944D-9C43-39873ECB20AD}"/>
+              </a:ext>
+            </a:extLst>
+          </p:cNvPr>
+          <p:cNvPicPr>
+            <a:picLocks noChangeAspect="1"/>
+          </p:cNvPicPr>
+          <p:nvPr/>
+        </p:nvPicPr>
+        <p:blipFill>
+          <a:blip r:embed="rId4"/>
+          <a:stretch>
+            <a:fillRect/>
+          </a:stretch>
+        </p:blipFill>
+        <p:spPr>
+          <a:xfrm>
+            <a:off x="6114782" y="1600046"/>
+            <a:ext cx="6047361" cy="4489938"/>
+          </a:xfrm>
+          <a:prstGeom prst="rect">
+            <a:avLst/>
+          </a:prstGeom>
+        </p:spPr>
+      </p:pic>
+    </p:spTree>
+    <p:extLst>
+      <p:ext uri="{BB962C8B-B14F-4D97-AF65-F5344CB8AC3E}">
+        <p14:creationId xmlns:p14="http://schemas.microsoft.com/office/powerpoint/2010/main" val="2245086434"/>
+      </p:ext>
+    </p:extLst>
+  </p:cSld>
+  <p:clrMapOvr>
+    <a:masterClrMapping/>
+  </p:clrMapOvr>
+</p:sld>
+</file>
+
+<file path=ppt/slides/slide13.xml><?xml version="1.0" encoding="utf-8"?>
+<p:sld xmlns:a="http://schemas.openxmlformats.org/drawingml/2006/main" xmlns:r="http://schemas.openxmlformats.org/officeDocument/2006/relationships" xmlns:p="http://schemas.openxmlformats.org/presentationml/2006/main">
+  <p:cSld>
+    <p:spTree>
+      <p:nvGrpSpPr>
+        <p:cNvPr id="1" name=""/>
+        <p:cNvGrpSpPr/>
+        <p:nvPr/>
+      </p:nvGrpSpPr>
+      <p:grpSpPr>
+        <a:xfrm>
+          <a:off x="0" y="0"/>
+          <a:ext cx="0" cy="0"/>
+          <a:chOff x="0" y="0"/>
+          <a:chExt cx="0" cy="0"/>
+        </a:xfrm>
+      </p:grpSpPr>
+      <p:sp>
+        <p:nvSpPr>
           <p:cNvPr id="4" name="TextBox 3">
             <a:extLst>
               <a:ext uri="{FF2B5EF4-FFF2-40B4-BE49-F238E27FC236}">
@@ -4836,7 +5553,7 @@
 </p:sld>
 </file>
 
-<file path=ppt/slides/slide11.xml><?xml version="1.0" encoding="utf-8"?>
+<file path=ppt/slides/slide14.xml><?xml version="1.0" encoding="utf-8"?>
 <p:sld xmlns:a="http://schemas.openxmlformats.org/drawingml/2006/main" xmlns:r="http://schemas.openxmlformats.org/officeDocument/2006/relationships" xmlns:p="http://schemas.openxmlformats.org/presentationml/2006/main">
   <p:cSld>
     <p:spTree>
@@ -4933,7 +5650,7 @@
 </p:sld>
 </file>
 
-<file path=ppt/slides/slide12.xml><?xml version="1.0" encoding="utf-8"?>
+<file path=ppt/slides/slide15.xml><?xml version="1.0" encoding="utf-8"?>
 <p:sld xmlns:a="http://schemas.openxmlformats.org/drawingml/2006/main" xmlns:r="http://schemas.openxmlformats.org/officeDocument/2006/relationships" xmlns:p="http://schemas.openxmlformats.org/presentationml/2006/main">
   <p:cSld>
     <p:spTree>
@@ -5130,7 +5847,7 @@
 </p:sld>
 </file>
 
-<file path=ppt/slides/slide13.xml><?xml version="1.0" encoding="utf-8"?>
+<file path=ppt/slides/slide16.xml><?xml version="1.0" encoding="utf-8"?>
 <p:sld xmlns:a="http://schemas.openxmlformats.org/drawingml/2006/main" xmlns:r="http://schemas.openxmlformats.org/officeDocument/2006/relationships" xmlns:p="http://schemas.openxmlformats.org/presentationml/2006/main">
   <p:cSld>
     <p:spTree>
@@ -5220,7 +5937,7 @@
 </p:sld>
 </file>
 
-<file path=ppt/slides/slide14.xml><?xml version="1.0" encoding="utf-8"?>
+<file path=ppt/slides/slide17.xml><?xml version="1.0" encoding="utf-8"?>
 <p:sld xmlns:a="http://schemas.openxmlformats.org/drawingml/2006/main" xmlns:r="http://schemas.openxmlformats.org/officeDocument/2006/relationships" xmlns:p="http://schemas.openxmlformats.org/presentationml/2006/main">
   <p:cSld>
     <p:spTree>
@@ -5421,7 +6138,7 @@
 </p:sld>
 </file>
 
-<file path=ppt/slides/slide15.xml><?xml version="1.0" encoding="utf-8"?>
+<file path=ppt/slides/slide18.xml><?xml version="1.0" encoding="utf-8"?>
 <p:sld xmlns:a="http://schemas.openxmlformats.org/drawingml/2006/main" xmlns:r="http://schemas.openxmlformats.org/officeDocument/2006/relationships" xmlns:p="http://schemas.openxmlformats.org/presentationml/2006/main">
   <p:cSld>
     <p:spTree>
@@ -5639,7 +6356,7 @@
 </p:sld>
 </file>
 
-<file path=ppt/slides/slide16.xml><?xml version="1.0" encoding="utf-8"?>
+<file path=ppt/slides/slide19.xml><?xml version="1.0" encoding="utf-8"?>
 <p:sld xmlns:a="http://schemas.openxmlformats.org/drawingml/2006/main" xmlns:r="http://schemas.openxmlformats.org/officeDocument/2006/relationships" xmlns:p="http://schemas.openxmlformats.org/presentationml/2006/main">
   <p:cSld>
     <p:spTree>
@@ -5763,8 +6480,21 @@
                   <a:srgbClr val="FF0000"/>
                 </a:solidFill>
               </a:rPr>
+              <a:t>ALTO Y </a:t>
+            </a:r>
+            <a:r>
+              <a:rPr lang="en-US" sz="2800" b="1" dirty="0">
+                <a:solidFill>
+                  <a:schemeClr val="accent6"/>
+                </a:solidFill>
+              </a:rPr>
               <a:t>BAJANDO</a:t>
             </a:r>
+            <a:endParaRPr lang="en-US" sz="2800" b="1" dirty="0">
+              <a:solidFill>
+                <a:srgbClr val="FF0000"/>
+              </a:solidFill>
+            </a:endParaRPr>
           </a:p>
         </p:txBody>
       </p:sp>
@@ -5858,6 +6588,14 @@
                   <a:srgbClr val="FF0000"/>
                 </a:solidFill>
               </a:rPr>
+              <a:t>ALTO Y </a:t>
+            </a:r>
+            <a:r>
+              <a:rPr lang="en-US" sz="2800" b="1" dirty="0">
+                <a:solidFill>
+                  <a:schemeClr val="accent6"/>
+                </a:solidFill>
+              </a:rPr>
               <a:t>BAJANDO</a:t>
             </a:r>
             <a:endParaRPr lang="en-US" sz="2800" b="1" dirty="0">
@@ -5954,7 +6692,97 @@
 </p:sld>
 </file>
 
-<file path=ppt/slides/slide17.xml><?xml version="1.0" encoding="utf-8"?>
+<file path=ppt/slides/slide2.xml><?xml version="1.0" encoding="utf-8"?>
+<p:sld xmlns:a="http://schemas.openxmlformats.org/drawingml/2006/main" xmlns:r="http://schemas.openxmlformats.org/officeDocument/2006/relationships" xmlns:p="http://schemas.openxmlformats.org/presentationml/2006/main">
+  <p:cSld>
+    <p:spTree>
+      <p:nvGrpSpPr>
+        <p:cNvPr id="1" name=""/>
+        <p:cNvGrpSpPr/>
+        <p:nvPr/>
+      </p:nvGrpSpPr>
+      <p:grpSpPr>
+        <a:xfrm>
+          <a:off x="0" y="0"/>
+          <a:ext cx="0" cy="0"/>
+          <a:chOff x="0" y="0"/>
+          <a:chExt cx="0" cy="0"/>
+        </a:xfrm>
+      </p:grpSpPr>
+      <p:sp>
+        <p:nvSpPr>
+          <p:cNvPr id="4" name="TextBox 3">
+            <a:extLst>
+              <a:ext uri="{FF2B5EF4-FFF2-40B4-BE49-F238E27FC236}">
+                <a16:creationId xmlns:a16="http://schemas.microsoft.com/office/drawing/2014/main" id="{5BCAFE7A-E299-D14E-9413-EB5C984AF441}"/>
+              </a:ext>
+            </a:extLst>
+          </p:cNvPr>
+          <p:cNvSpPr txBox="1"/>
+          <p:nvPr/>
+        </p:nvSpPr>
+        <p:spPr>
+          <a:xfrm>
+            <a:off x="3308808" y="2809188"/>
+            <a:ext cx="5858335" cy="1015663"/>
+          </a:xfrm>
+          <a:prstGeom prst="rect">
+            <a:avLst/>
+          </a:prstGeom>
+          <a:noFill/>
+        </p:spPr>
+        <p:txBody>
+          <a:bodyPr wrap="none" rtlCol="0">
+            <a:spAutoFit/>
+          </a:bodyPr>
+          <a:lstStyle/>
+          <a:p>
+            <a:r>
+              <a:rPr lang="en-US" sz="6000" dirty="0"/>
+              <a:t>PACIENTES EN UCI</a:t>
+            </a:r>
+          </a:p>
+        </p:txBody>
+      </p:sp>
+      <p:sp>
+        <p:nvSpPr>
+          <p:cNvPr id="5" name="Title 4">
+            <a:extLst>
+              <a:ext uri="{FF2B5EF4-FFF2-40B4-BE49-F238E27FC236}">
+                <a16:creationId xmlns:a16="http://schemas.microsoft.com/office/drawing/2014/main" id="{5B465201-ED47-B64A-B505-4DDA25649C32}"/>
+              </a:ext>
+            </a:extLst>
+          </p:cNvPr>
+          <p:cNvSpPr>
+            <a:spLocks noGrp="1"/>
+          </p:cNvSpPr>
+          <p:nvPr>
+            <p:ph type="title"/>
+          </p:nvPr>
+        </p:nvSpPr>
+        <p:spPr/>
+        <p:txBody>
+          <a:bodyPr/>
+          <a:lstStyle/>
+          <a:p>
+            <a:endParaRPr lang="en-US"/>
+          </a:p>
+        </p:txBody>
+      </p:sp>
+    </p:spTree>
+    <p:extLst>
+      <p:ext uri="{BB962C8B-B14F-4D97-AF65-F5344CB8AC3E}">
+        <p14:creationId xmlns:p14="http://schemas.microsoft.com/office/powerpoint/2010/main" val="1473504558"/>
+      </p:ext>
+    </p:extLst>
+  </p:cSld>
+  <p:clrMapOvr>
+    <a:masterClrMapping/>
+  </p:clrMapOvr>
+</p:sld>
+</file>
+
+<file path=ppt/slides/slide20.xml><?xml version="1.0" encoding="utf-8"?>
 <p:sld xmlns:a="http://schemas.openxmlformats.org/drawingml/2006/main" xmlns:r="http://schemas.openxmlformats.org/officeDocument/2006/relationships" xmlns:p="http://schemas.openxmlformats.org/presentationml/2006/main" show="0">
   <p:cSld>
     <p:spTree>
@@ -6044,7 +6872,7 @@
 </p:sld>
 </file>
 
-<file path=ppt/slides/slide18.xml><?xml version="1.0" encoding="utf-8"?>
+<file path=ppt/slides/slide21.xml><?xml version="1.0" encoding="utf-8"?>
 <p:sld xmlns:a="http://schemas.openxmlformats.org/drawingml/2006/main" xmlns:r="http://schemas.openxmlformats.org/officeDocument/2006/relationships" xmlns:p="http://schemas.openxmlformats.org/presentationml/2006/main" show="0">
   <p:cSld>
     <p:spTree>
@@ -6149,7 +6977,7 @@
 </p:sld>
 </file>
 
-<file path=ppt/slides/slide19.xml><?xml version="1.0" encoding="utf-8"?>
+<file path=ppt/slides/slide22.xml><?xml version="1.0" encoding="utf-8"?>
 <p:sld xmlns:a="http://schemas.openxmlformats.org/drawingml/2006/main" xmlns:r="http://schemas.openxmlformats.org/officeDocument/2006/relationships" xmlns:p="http://schemas.openxmlformats.org/presentationml/2006/main" show="0">
   <p:cSld>
     <p:spTree>
@@ -6254,7 +7082,7 @@
 </p:sld>
 </file>
 
-<file path=ppt/slides/slide2.xml><?xml version="1.0" encoding="utf-8"?>
+<file path=ppt/slides/slide23.xml><?xml version="1.0" encoding="utf-8"?>
 <p:sld xmlns:a="http://schemas.openxmlformats.org/drawingml/2006/main" xmlns:r="http://schemas.openxmlformats.org/officeDocument/2006/relationships" xmlns:p="http://schemas.openxmlformats.org/presentationml/2006/main">
   <p:cSld>
     <p:spTree>
@@ -6285,96 +7113,6 @@
         </p:nvSpPr>
         <p:spPr>
           <a:xfrm>
-            <a:off x="3308808" y="2809188"/>
-            <a:ext cx="5858335" cy="1015663"/>
-          </a:xfrm>
-          <a:prstGeom prst="rect">
-            <a:avLst/>
-          </a:prstGeom>
-          <a:noFill/>
-        </p:spPr>
-        <p:txBody>
-          <a:bodyPr wrap="none" rtlCol="0">
-            <a:spAutoFit/>
-          </a:bodyPr>
-          <a:lstStyle/>
-          <a:p>
-            <a:r>
-              <a:rPr lang="en-US" sz="6000" dirty="0"/>
-              <a:t>PACIENTES EN UCI</a:t>
-            </a:r>
-          </a:p>
-        </p:txBody>
-      </p:sp>
-      <p:sp>
-        <p:nvSpPr>
-          <p:cNvPr id="5" name="Title 4">
-            <a:extLst>
-              <a:ext uri="{FF2B5EF4-FFF2-40B4-BE49-F238E27FC236}">
-                <a16:creationId xmlns:a16="http://schemas.microsoft.com/office/drawing/2014/main" id="{5B465201-ED47-B64A-B505-4DDA25649C32}"/>
-              </a:ext>
-            </a:extLst>
-          </p:cNvPr>
-          <p:cNvSpPr>
-            <a:spLocks noGrp="1"/>
-          </p:cNvSpPr>
-          <p:nvPr>
-            <p:ph type="title"/>
-          </p:nvPr>
-        </p:nvSpPr>
-        <p:spPr/>
-        <p:txBody>
-          <a:bodyPr/>
-          <a:lstStyle/>
-          <a:p>
-            <a:endParaRPr lang="en-US"/>
-          </a:p>
-        </p:txBody>
-      </p:sp>
-    </p:spTree>
-    <p:extLst>
-      <p:ext uri="{BB962C8B-B14F-4D97-AF65-F5344CB8AC3E}">
-        <p14:creationId xmlns:p14="http://schemas.microsoft.com/office/powerpoint/2010/main" val="1473504558"/>
-      </p:ext>
-    </p:extLst>
-  </p:cSld>
-  <p:clrMapOvr>
-    <a:masterClrMapping/>
-  </p:clrMapOvr>
-</p:sld>
-</file>
-
-<file path=ppt/slides/slide20.xml><?xml version="1.0" encoding="utf-8"?>
-<p:sld xmlns:a="http://schemas.openxmlformats.org/drawingml/2006/main" xmlns:r="http://schemas.openxmlformats.org/officeDocument/2006/relationships" xmlns:p="http://schemas.openxmlformats.org/presentationml/2006/main">
-  <p:cSld>
-    <p:spTree>
-      <p:nvGrpSpPr>
-        <p:cNvPr id="1" name=""/>
-        <p:cNvGrpSpPr/>
-        <p:nvPr/>
-      </p:nvGrpSpPr>
-      <p:grpSpPr>
-        <a:xfrm>
-          <a:off x="0" y="0"/>
-          <a:ext cx="0" cy="0"/>
-          <a:chOff x="0" y="0"/>
-          <a:chExt cx="0" cy="0"/>
-        </a:xfrm>
-      </p:grpSpPr>
-      <p:sp>
-        <p:nvSpPr>
-          <p:cNvPr id="4" name="TextBox 3">
-            <a:extLst>
-              <a:ext uri="{FF2B5EF4-FFF2-40B4-BE49-F238E27FC236}">
-                <a16:creationId xmlns:a16="http://schemas.microsoft.com/office/drawing/2014/main" id="{5BCAFE7A-E299-D14E-9413-EB5C984AF441}"/>
-              </a:ext>
-            </a:extLst>
-          </p:cNvPr>
-          <p:cNvSpPr txBox="1"/>
-          <p:nvPr/>
-        </p:nvSpPr>
-        <p:spPr>
-          <a:xfrm>
             <a:off x="3621059" y="2846895"/>
             <a:ext cx="4476610" cy="1015663"/>
           </a:xfrm>
@@ -6434,7 +7172,7 @@
 </p:sld>
 </file>
 
-<file path=ppt/slides/slide21.xml><?xml version="1.0" encoding="utf-8"?>
+<file path=ppt/slides/slide24.xml><?xml version="1.0" encoding="utf-8"?>
 <p:sld xmlns:a="http://schemas.openxmlformats.org/drawingml/2006/main" xmlns:r="http://schemas.openxmlformats.org/officeDocument/2006/relationships" xmlns:p="http://schemas.openxmlformats.org/presentationml/2006/main">
   <p:cSld>
     <p:spTree>
@@ -6601,6 +7339,41 @@
           </a:prstGeom>
         </p:spPr>
       </p:pic>
+      <p:sp>
+        <p:nvSpPr>
+          <p:cNvPr id="2" name="TextBox 1">
+            <a:extLst>
+              <a:ext uri="{FF2B5EF4-FFF2-40B4-BE49-F238E27FC236}">
+                <a16:creationId xmlns:a16="http://schemas.microsoft.com/office/drawing/2014/main" id="{FE913D83-78EC-F64F-98C6-1C151ADBA8A9}"/>
+              </a:ext>
+            </a:extLst>
+          </p:cNvPr>
+          <p:cNvSpPr txBox="1"/>
+          <p:nvPr/>
+        </p:nvSpPr>
+        <p:spPr>
+          <a:xfrm>
+            <a:off x="4751176" y="833401"/>
+            <a:ext cx="2689647" cy="461665"/>
+          </a:xfrm>
+          <a:prstGeom prst="rect">
+            <a:avLst/>
+          </a:prstGeom>
+          <a:noFill/>
+        </p:spPr>
+        <p:txBody>
+          <a:bodyPr wrap="none" rtlCol="0">
+            <a:spAutoFit/>
+          </a:bodyPr>
+          <a:lstStyle/>
+          <a:p>
+            <a:r>
+              <a:rPr lang="en-CL" sz="2400" dirty="0"/>
+              <a:t>Mayores de 18 años</a:t>
+            </a:r>
+          </a:p>
+        </p:txBody>
+      </p:sp>
     </p:spTree>
     <p:extLst>
       <p:ext uri="{BB962C8B-B14F-4D97-AF65-F5344CB8AC3E}">
@@ -6614,7 +7387,222 @@
 </p:sld>
 </file>
 
-<file path=ppt/slides/slide22.xml><?xml version="1.0" encoding="utf-8"?>
+<file path=ppt/slides/slide25.xml><?xml version="1.0" encoding="utf-8"?>
+<p:sld xmlns:a="http://schemas.openxmlformats.org/drawingml/2006/main" xmlns:r="http://schemas.openxmlformats.org/officeDocument/2006/relationships" xmlns:p="http://schemas.openxmlformats.org/presentationml/2006/main">
+  <p:cSld>
+    <p:spTree>
+      <p:nvGrpSpPr>
+        <p:cNvPr id="1" name=""/>
+        <p:cNvGrpSpPr/>
+        <p:nvPr/>
+      </p:nvGrpSpPr>
+      <p:grpSpPr>
+        <a:xfrm>
+          <a:off x="0" y="0"/>
+          <a:ext cx="0" cy="0"/>
+          <a:chOff x="0" y="0"/>
+          <a:chExt cx="0" cy="0"/>
+        </a:xfrm>
+      </p:grpSpPr>
+      <p:pic>
+        <p:nvPicPr>
+          <p:cNvPr id="4" name="Picture 3">
+            <a:extLst>
+              <a:ext uri="{FF2B5EF4-FFF2-40B4-BE49-F238E27FC236}">
+                <a16:creationId xmlns:a16="http://schemas.microsoft.com/office/drawing/2014/main" id="{E5E257D0-7B0E-1141-B562-03D18FD2E66C}"/>
+              </a:ext>
+            </a:extLst>
+          </p:cNvPr>
+          <p:cNvPicPr>
+            <a:picLocks noChangeAspect="1"/>
+          </p:cNvPicPr>
+          <p:nvPr/>
+        </p:nvPicPr>
+        <p:blipFill>
+          <a:blip r:embed="rId2"/>
+          <a:stretch>
+            <a:fillRect/>
+          </a:stretch>
+        </p:blipFill>
+        <p:spPr>
+          <a:xfrm>
+            <a:off x="840897" y="598395"/>
+            <a:ext cx="10951029" cy="5661210"/>
+          </a:xfrm>
+          <a:prstGeom prst="rect">
+            <a:avLst/>
+          </a:prstGeom>
+        </p:spPr>
+      </p:pic>
+      <p:sp>
+        <p:nvSpPr>
+          <p:cNvPr id="9" name="TextBox 8">
+            <a:extLst>
+              <a:ext uri="{FF2B5EF4-FFF2-40B4-BE49-F238E27FC236}">
+                <a16:creationId xmlns:a16="http://schemas.microsoft.com/office/drawing/2014/main" id="{22433A70-977D-C840-9BCB-9ECF9B80CB77}"/>
+              </a:ext>
+            </a:extLst>
+          </p:cNvPr>
+          <p:cNvSpPr txBox="1"/>
+          <p:nvPr/>
+        </p:nvSpPr>
+        <p:spPr>
+          <a:xfrm>
+            <a:off x="-73478" y="0"/>
+            <a:ext cx="12338956" cy="569387"/>
+          </a:xfrm>
+          <a:prstGeom prst="rect">
+            <a:avLst/>
+          </a:prstGeom>
+          <a:noFill/>
+        </p:spPr>
+        <p:txBody>
+          <a:bodyPr wrap="square" rtlCol="0">
+            <a:spAutoFit/>
+          </a:bodyPr>
+          <a:lstStyle/>
+          <a:p>
+            <a:pPr algn="ctr"/>
+            <a:r>
+              <a:rPr lang="en-US" sz="3100" dirty="0" err="1"/>
+              <a:t>Cobertura</a:t>
+            </a:r>
+            <a:r>
+              <a:rPr lang="en-US" sz="3100" dirty="0"/>
+              <a:t> de </a:t>
+            </a:r>
+            <a:r>
+              <a:rPr lang="en-US" sz="3100" dirty="0" err="1"/>
+              <a:t>Vacunación</a:t>
+            </a:r>
+            <a:r>
+              <a:rPr lang="en-US" sz="3100" dirty="0"/>
+              <a:t> COVID-19 </a:t>
+            </a:r>
+            <a:r>
+              <a:rPr lang="en-US" sz="3100" dirty="0" err="1"/>
+              <a:t>en</a:t>
+            </a:r>
+            <a:r>
+              <a:rPr lang="en-US" sz="3100" dirty="0"/>
+              <a:t> Chile</a:t>
+            </a:r>
+          </a:p>
+        </p:txBody>
+      </p:sp>
+      <p:sp>
+        <p:nvSpPr>
+          <p:cNvPr id="5" name="TextBox 4">
+            <a:extLst>
+              <a:ext uri="{FF2B5EF4-FFF2-40B4-BE49-F238E27FC236}">
+                <a16:creationId xmlns:a16="http://schemas.microsoft.com/office/drawing/2014/main" id="{AE60033C-48B3-1E42-A180-100FEDC8D62B}"/>
+              </a:ext>
+            </a:extLst>
+          </p:cNvPr>
+          <p:cNvSpPr txBox="1"/>
+          <p:nvPr/>
+        </p:nvSpPr>
+        <p:spPr>
+          <a:xfrm>
+            <a:off x="160256" y="6447934"/>
+            <a:ext cx="5882188" cy="369332"/>
+          </a:xfrm>
+          <a:prstGeom prst="rect">
+            <a:avLst/>
+          </a:prstGeom>
+          <a:noFill/>
+        </p:spPr>
+        <p:txBody>
+          <a:bodyPr wrap="none" rtlCol="0">
+            <a:spAutoFit/>
+          </a:bodyPr>
+          <a:lstStyle/>
+          <a:p>
+            <a:r>
+              <a:rPr lang="en-US" dirty="0"/>
+              <a:t>Fuente: </a:t>
+            </a:r>
+            <a:r>
+              <a:rPr lang="en-US" dirty="0" err="1"/>
+              <a:t>Repositorio</a:t>
+            </a:r>
+            <a:r>
+              <a:rPr lang="en-US" dirty="0"/>
+              <a:t> de </a:t>
+            </a:r>
+            <a:r>
+              <a:rPr lang="en-US" dirty="0" err="1"/>
+              <a:t>Datos</a:t>
+            </a:r>
+            <a:r>
+              <a:rPr lang="en-US" dirty="0"/>
+              <a:t> COVID19, </a:t>
+            </a:r>
+            <a:r>
+              <a:rPr lang="en-US" dirty="0" err="1"/>
+              <a:t>Ministerio</a:t>
+            </a:r>
+            <a:r>
+              <a:rPr lang="en-US" dirty="0"/>
+              <a:t> de </a:t>
+            </a:r>
+            <a:r>
+              <a:rPr lang="en-US" dirty="0" err="1"/>
+              <a:t>Ciencia</a:t>
+            </a:r>
+            <a:endParaRPr lang="en-US" dirty="0"/>
+          </a:p>
+        </p:txBody>
+      </p:sp>
+      <p:sp>
+        <p:nvSpPr>
+          <p:cNvPr id="2" name="TextBox 1">
+            <a:extLst>
+              <a:ext uri="{FF2B5EF4-FFF2-40B4-BE49-F238E27FC236}">
+                <a16:creationId xmlns:a16="http://schemas.microsoft.com/office/drawing/2014/main" id="{FE913D83-78EC-F64F-98C6-1C151ADBA8A9}"/>
+              </a:ext>
+            </a:extLst>
+          </p:cNvPr>
+          <p:cNvSpPr txBox="1"/>
+          <p:nvPr/>
+        </p:nvSpPr>
+        <p:spPr>
+          <a:xfrm>
+            <a:off x="4751176" y="833401"/>
+            <a:ext cx="1596912" cy="461665"/>
+          </a:xfrm>
+          <a:prstGeom prst="rect">
+            <a:avLst/>
+          </a:prstGeom>
+          <a:noFill/>
+        </p:spPr>
+        <p:txBody>
+          <a:bodyPr wrap="none" rtlCol="0">
+            <a:spAutoFit/>
+          </a:bodyPr>
+          <a:lstStyle/>
+          <a:p>
+            <a:r>
+              <a:rPr lang="en-CL" sz="2400" dirty="0"/>
+              <a:t>6 a 17 años</a:t>
+            </a:r>
+          </a:p>
+        </p:txBody>
+      </p:sp>
+    </p:spTree>
+    <p:extLst>
+      <p:ext uri="{BB962C8B-B14F-4D97-AF65-F5344CB8AC3E}">
+        <p14:creationId xmlns:p14="http://schemas.microsoft.com/office/powerpoint/2010/main" val="2319474179"/>
+      </p:ext>
+    </p:extLst>
+  </p:cSld>
+  <p:clrMapOvr>
+    <a:masterClrMapping/>
+  </p:clrMapOvr>
+</p:sld>
+</file>
+
+<file path=ppt/slides/slide26.xml><?xml version="1.0" encoding="utf-8"?>
 <p:sld xmlns:a="http://schemas.openxmlformats.org/drawingml/2006/main" xmlns:r="http://schemas.openxmlformats.org/officeDocument/2006/relationships" xmlns:p="http://schemas.openxmlformats.org/presentationml/2006/main">
   <p:cSld>
     <p:spTree>
@@ -6848,6 +7836,131 @@
       </p:grpSpPr>
       <p:sp>
         <p:nvSpPr>
+          <p:cNvPr id="6" name="TextBox 5">
+            <a:extLst>
+              <a:ext uri="{FF2B5EF4-FFF2-40B4-BE49-F238E27FC236}">
+                <a16:creationId xmlns:a16="http://schemas.microsoft.com/office/drawing/2014/main" id="{AB65407A-4582-004A-A45F-BD87B99ABAF2}"/>
+              </a:ext>
+            </a:extLst>
+          </p:cNvPr>
+          <p:cNvSpPr txBox="1"/>
+          <p:nvPr/>
+        </p:nvSpPr>
+        <p:spPr>
+          <a:xfrm>
+            <a:off x="2032611" y="214269"/>
+            <a:ext cx="8126777" cy="584775"/>
+          </a:xfrm>
+          <a:prstGeom prst="rect">
+            <a:avLst/>
+          </a:prstGeom>
+          <a:solidFill>
+            <a:schemeClr val="bg1"/>
+          </a:solidFill>
+        </p:spPr>
+        <p:txBody>
+          <a:bodyPr wrap="none" rtlCol="0">
+            <a:spAutoFit/>
+          </a:bodyPr>
+          <a:lstStyle/>
+          <a:p>
+            <a:r>
+              <a:rPr lang="en-US" sz="3200" dirty="0" err="1"/>
+              <a:t>Pacientes</a:t>
+            </a:r>
+            <a:r>
+              <a:rPr lang="en-US" sz="3200" dirty="0"/>
+              <a:t> COVID-19 </a:t>
+            </a:r>
+            <a:r>
+              <a:rPr lang="en-US" sz="3200" dirty="0" err="1"/>
+              <a:t>en</a:t>
+            </a:r>
+            <a:r>
+              <a:rPr lang="en-US" sz="3200" dirty="0"/>
+              <a:t> UCI </a:t>
+            </a:r>
+            <a:r>
+              <a:rPr lang="en-US" sz="3200" dirty="0" err="1"/>
+              <a:t>reportados</a:t>
+            </a:r>
+            <a:r>
+              <a:rPr lang="en-US" sz="3200" dirty="0"/>
+              <a:t> </a:t>
+            </a:r>
+            <a:r>
+              <a:rPr lang="en-US" sz="3200" dirty="0" err="1"/>
+              <a:t>en</a:t>
+            </a:r>
+            <a:r>
+              <a:rPr lang="en-US" sz="3200" dirty="0"/>
+              <a:t> Chile </a:t>
+            </a:r>
+          </a:p>
+        </p:txBody>
+      </p:sp>
+      <p:pic>
+        <p:nvPicPr>
+          <p:cNvPr id="3" name="Picture 2">
+            <a:extLst>
+              <a:ext uri="{FF2B5EF4-FFF2-40B4-BE49-F238E27FC236}">
+                <a16:creationId xmlns:a16="http://schemas.microsoft.com/office/drawing/2014/main" id="{BE600D4D-5491-6146-B158-C32897446BA1}"/>
+              </a:ext>
+            </a:extLst>
+          </p:cNvPr>
+          <p:cNvPicPr>
+            <a:picLocks noChangeAspect="1"/>
+          </p:cNvPicPr>
+          <p:nvPr/>
+        </p:nvPicPr>
+        <p:blipFill>
+          <a:blip r:embed="rId2"/>
+          <a:stretch>
+            <a:fillRect/>
+          </a:stretch>
+        </p:blipFill>
+        <p:spPr>
+          <a:xfrm>
+            <a:off x="2562066" y="864360"/>
+            <a:ext cx="7067865" cy="5671744"/>
+          </a:xfrm>
+          <a:prstGeom prst="rect">
+            <a:avLst/>
+          </a:prstGeom>
+        </p:spPr>
+      </p:pic>
+    </p:spTree>
+    <p:extLst>
+      <p:ext uri="{BB962C8B-B14F-4D97-AF65-F5344CB8AC3E}">
+        <p14:creationId xmlns:p14="http://schemas.microsoft.com/office/powerpoint/2010/main" val="261074670"/>
+      </p:ext>
+    </p:extLst>
+  </p:cSld>
+  <p:clrMapOvr>
+    <a:masterClrMapping/>
+  </p:clrMapOvr>
+</p:sld>
+</file>
+
+<file path=ppt/slides/slide5.xml><?xml version="1.0" encoding="utf-8"?>
+<p:sld xmlns:a="http://schemas.openxmlformats.org/drawingml/2006/main" xmlns:r="http://schemas.openxmlformats.org/officeDocument/2006/relationships" xmlns:p="http://schemas.openxmlformats.org/presentationml/2006/main">
+  <p:cSld>
+    <p:spTree>
+      <p:nvGrpSpPr>
+        <p:cNvPr id="1" name=""/>
+        <p:cNvGrpSpPr/>
+        <p:nvPr/>
+      </p:nvGrpSpPr>
+      <p:grpSpPr>
+        <a:xfrm>
+          <a:off x="0" y="0"/>
+          <a:ext cx="0" cy="0"/>
+          <a:chOff x="0" y="0"/>
+          <a:chExt cx="0" cy="0"/>
+        </a:xfrm>
+      </p:grpSpPr>
+      <p:sp>
+        <p:nvSpPr>
           <p:cNvPr id="4" name="TextBox 3">
             <a:extLst>
               <a:ext uri="{FF2B5EF4-FFF2-40B4-BE49-F238E27FC236}">
@@ -6919,7 +8032,7 @@
 </p:sld>
 </file>
 
-<file path=ppt/slides/slide5.xml><?xml version="1.0" encoding="utf-8"?>
+<file path=ppt/slides/slide6.xml><?xml version="1.0" encoding="utf-8"?>
 <p:sld xmlns:a="http://schemas.openxmlformats.org/drawingml/2006/main" xmlns:r="http://schemas.openxmlformats.org/officeDocument/2006/relationships" xmlns:p="http://schemas.openxmlformats.org/presentationml/2006/main">
   <p:cSld>
     <p:spTree>
@@ -7044,7 +8157,7 @@
 </p:sld>
 </file>
 
-<file path=ppt/slides/slide6.xml><?xml version="1.0" encoding="utf-8"?>
+<file path=ppt/slides/slide7.xml><?xml version="1.0" encoding="utf-8"?>
 <p:sld xmlns:a="http://schemas.openxmlformats.org/drawingml/2006/main" xmlns:r="http://schemas.openxmlformats.org/officeDocument/2006/relationships" xmlns:p="http://schemas.openxmlformats.org/presentationml/2006/main">
   <p:cSld>
     <p:spTree>
@@ -7342,96 +8455,6 @@
 </p:sld>
 </file>
 
-<file path=ppt/slides/slide7.xml><?xml version="1.0" encoding="utf-8"?>
-<p:sld xmlns:a="http://schemas.openxmlformats.org/drawingml/2006/main" xmlns:r="http://schemas.openxmlformats.org/officeDocument/2006/relationships" xmlns:p="http://schemas.openxmlformats.org/presentationml/2006/main">
-  <p:cSld>
-    <p:spTree>
-      <p:nvGrpSpPr>
-        <p:cNvPr id="1" name=""/>
-        <p:cNvGrpSpPr/>
-        <p:nvPr/>
-      </p:nvGrpSpPr>
-      <p:grpSpPr>
-        <a:xfrm>
-          <a:off x="0" y="0"/>
-          <a:ext cx="0" cy="0"/>
-          <a:chOff x="0" y="0"/>
-          <a:chExt cx="0" cy="0"/>
-        </a:xfrm>
-      </p:grpSpPr>
-      <p:sp>
-        <p:nvSpPr>
-          <p:cNvPr id="4" name="TextBox 3">
-            <a:extLst>
-              <a:ext uri="{FF2B5EF4-FFF2-40B4-BE49-F238E27FC236}">
-                <a16:creationId xmlns:a16="http://schemas.microsoft.com/office/drawing/2014/main" id="{5BCAFE7A-E299-D14E-9413-EB5C984AF441}"/>
-              </a:ext>
-            </a:extLst>
-          </p:cNvPr>
-          <p:cNvSpPr txBox="1"/>
-          <p:nvPr/>
-        </p:nvSpPr>
-        <p:spPr>
-          <a:xfrm>
-            <a:off x="3621059" y="2846895"/>
-            <a:ext cx="4949881" cy="1015663"/>
-          </a:xfrm>
-          <a:prstGeom prst="rect">
-            <a:avLst/>
-          </a:prstGeom>
-          <a:noFill/>
-        </p:spPr>
-        <p:txBody>
-          <a:bodyPr wrap="none" rtlCol="0">
-            <a:spAutoFit/>
-          </a:bodyPr>
-          <a:lstStyle/>
-          <a:p>
-            <a:r>
-              <a:rPr lang="en-US" sz="6000" dirty="0"/>
-              <a:t>CASOS &amp; TESTS</a:t>
-            </a:r>
-          </a:p>
-        </p:txBody>
-      </p:sp>
-      <p:sp>
-        <p:nvSpPr>
-          <p:cNvPr id="5" name="Title 4">
-            <a:extLst>
-              <a:ext uri="{FF2B5EF4-FFF2-40B4-BE49-F238E27FC236}">
-                <a16:creationId xmlns:a16="http://schemas.microsoft.com/office/drawing/2014/main" id="{5B465201-ED47-B64A-B505-4DDA25649C32}"/>
-              </a:ext>
-            </a:extLst>
-          </p:cNvPr>
-          <p:cNvSpPr>
-            <a:spLocks noGrp="1"/>
-          </p:cNvSpPr>
-          <p:nvPr>
-            <p:ph type="title"/>
-          </p:nvPr>
-        </p:nvSpPr>
-        <p:spPr/>
-        <p:txBody>
-          <a:bodyPr/>
-          <a:lstStyle/>
-          <a:p>
-            <a:endParaRPr lang="en-US"/>
-          </a:p>
-        </p:txBody>
-      </p:sp>
-    </p:spTree>
-    <p:extLst>
-      <p:ext uri="{BB962C8B-B14F-4D97-AF65-F5344CB8AC3E}">
-        <p14:creationId xmlns:p14="http://schemas.microsoft.com/office/powerpoint/2010/main" val="3304157546"/>
-      </p:ext>
-    </p:extLst>
-  </p:cSld>
-  <p:clrMapOvr>
-    <a:masterClrMapping/>
-  </p:clrMapOvr>
-</p:sld>
-</file>
-
 <file path=ppt/slides/slide8.xml><?xml version="1.0" encoding="utf-8"?>
 <p:sld xmlns:a="http://schemas.openxmlformats.org/drawingml/2006/main" xmlns:r="http://schemas.openxmlformats.org/officeDocument/2006/relationships" xmlns:p="http://schemas.openxmlformats.org/presentationml/2006/main">
   <p:cSld>
@@ -7451,10 +8474,10 @@
       </p:grpSpPr>
       <p:sp>
         <p:nvSpPr>
-          <p:cNvPr id="6" name="TextBox 5">
-            <a:extLst>
-              <a:ext uri="{FF2B5EF4-FFF2-40B4-BE49-F238E27FC236}">
-                <a16:creationId xmlns:a16="http://schemas.microsoft.com/office/drawing/2014/main" id="{AB65407A-4582-004A-A45F-BD87B99ABAF2}"/>
+          <p:cNvPr id="3" name="TextBox 2">
+            <a:extLst>
+              <a:ext uri="{FF2B5EF4-FFF2-40B4-BE49-F238E27FC236}">
+                <a16:creationId xmlns:a16="http://schemas.microsoft.com/office/drawing/2014/main" id="{A2257B24-98EA-6F4F-A0A3-0620C5A6F7E8}"/>
               </a:ext>
             </a:extLst>
           </p:cNvPr>
@@ -7463,8 +8486,8 @@
         </p:nvSpPr>
         <p:spPr>
           <a:xfrm>
-            <a:off x="2627010" y="128200"/>
-            <a:ext cx="6937980" cy="584775"/>
+            <a:off x="0" y="28575"/>
+            <a:ext cx="12227451" cy="954107"/>
           </a:xfrm>
           <a:prstGeom prst="rect">
             <a:avLst/>
@@ -7474,16 +8497,164 @@
           </a:solidFill>
         </p:spPr>
         <p:txBody>
-          <a:bodyPr wrap="square" rtlCol="0">
+          <a:bodyPr wrap="none" rtlCol="0">
             <a:spAutoFit/>
           </a:bodyPr>
           <a:lstStyle/>
           <a:p>
             <a:pPr algn="ctr"/>
             <a:r>
+              <a:rPr lang="en-US" sz="3200" dirty="0" err="1"/>
+              <a:t>Fallecidos</a:t>
+            </a:r>
+            <a:r>
               <a:rPr lang="en-US" sz="3200" dirty="0"/>
-              <a:t>CASOS CONFIRMADOS POR SEMANA </a:t>
-            </a:r>
+              <a:t> </a:t>
+            </a:r>
+            <a:r>
+              <a:rPr lang="en-US" sz="3200" dirty="0" err="1"/>
+              <a:t>semanales</a:t>
+            </a:r>
+            <a:r>
+              <a:rPr lang="en-US" sz="3200" dirty="0"/>
+              <a:t> </a:t>
+            </a:r>
+            <a:r>
+              <a:rPr lang="en-US" sz="3200" dirty="0" err="1"/>
+              <a:t>reportados</a:t>
+            </a:r>
+            <a:r>
+              <a:rPr lang="en-US" sz="3200" dirty="0"/>
+              <a:t> </a:t>
+            </a:r>
+            <a:r>
+              <a:rPr lang="en-US" sz="3200" dirty="0" err="1"/>
+              <a:t>por</a:t>
+            </a:r>
+            <a:r>
+              <a:rPr lang="en-US" sz="3200" dirty="0"/>
+              <a:t> DEIS</a:t>
+            </a:r>
+          </a:p>
+          <a:p>
+            <a:pPr algn="ctr"/>
+            <a:r>
+              <a:rPr lang="en-US" sz="2400" b="1" dirty="0">
+                <a:solidFill>
+                  <a:srgbClr val="FF0000"/>
+                </a:solidFill>
+              </a:rPr>
+              <a:t>POR FECHA DE FALLECIMIENTO </a:t>
+            </a:r>
+            <a:r>
+              <a:rPr lang="en-US" sz="2400" dirty="0"/>
+              <a:t>con COVID19 </a:t>
+            </a:r>
+            <a:r>
+              <a:rPr lang="en-US" sz="2400" b="1" dirty="0"/>
+              <a:t>CONFIRMADO &amp; PROBABLE </a:t>
+            </a:r>
+            <a:r>
+              <a:rPr lang="en-US" sz="2400" dirty="0" err="1"/>
+              <a:t>como</a:t>
+            </a:r>
+            <a:r>
+              <a:rPr lang="en-US" sz="2400" dirty="0"/>
+              <a:t> causa de </a:t>
+            </a:r>
+            <a:r>
+              <a:rPr lang="en-US" sz="2400" dirty="0" err="1"/>
+              <a:t>muerte</a:t>
+            </a:r>
+            <a:endParaRPr lang="en-US" sz="2400" dirty="0"/>
+          </a:p>
+        </p:txBody>
+      </p:sp>
+      <p:sp>
+        <p:nvSpPr>
+          <p:cNvPr id="8" name="TextBox 7">
+            <a:extLst>
+              <a:ext uri="{FF2B5EF4-FFF2-40B4-BE49-F238E27FC236}">
+                <a16:creationId xmlns:a16="http://schemas.microsoft.com/office/drawing/2014/main" id="{AE8DFFE5-8EDE-684D-B21D-1698CF54CC86}"/>
+              </a:ext>
+            </a:extLst>
+          </p:cNvPr>
+          <p:cNvSpPr txBox="1"/>
+          <p:nvPr/>
+        </p:nvSpPr>
+        <p:spPr>
+          <a:xfrm>
+            <a:off x="97649" y="6417922"/>
+            <a:ext cx="8327023" cy="369332"/>
+          </a:xfrm>
+          <a:prstGeom prst="rect">
+            <a:avLst/>
+          </a:prstGeom>
+          <a:noFill/>
+        </p:spPr>
+        <p:txBody>
+          <a:bodyPr wrap="none" rtlCol="0">
+            <a:spAutoFit/>
+          </a:bodyPr>
+          <a:lstStyle/>
+          <a:p>
+            <a:r>
+              <a:rPr lang="en-US" dirty="0"/>
+              <a:t>Fuente: </a:t>
+            </a:r>
+            <a:r>
+              <a:rPr lang="en-US" dirty="0" err="1"/>
+              <a:t>Departamento</a:t>
+            </a:r>
+            <a:r>
+              <a:rPr lang="en-US" dirty="0"/>
+              <a:t> de </a:t>
+            </a:r>
+            <a:r>
+              <a:rPr lang="en-US" dirty="0" err="1"/>
+              <a:t>Estadística</a:t>
+            </a:r>
+            <a:r>
+              <a:rPr lang="en-US" dirty="0"/>
+              <a:t> e </a:t>
+            </a:r>
+            <a:r>
+              <a:rPr lang="en-US" dirty="0" err="1"/>
+              <a:t>Información</a:t>
+            </a:r>
+            <a:r>
+              <a:rPr lang="en-US" dirty="0"/>
+              <a:t> </a:t>
+            </a:r>
+            <a:r>
+              <a:rPr lang="en-US" dirty="0" err="1"/>
+              <a:t>en</a:t>
+            </a:r>
+            <a:r>
+              <a:rPr lang="en-US" dirty="0"/>
+              <a:t> </a:t>
+            </a:r>
+            <a:r>
+              <a:rPr lang="en-US" dirty="0" err="1"/>
+              <a:t>Salud</a:t>
+            </a:r>
+            <a:r>
+              <a:rPr lang="en-US" dirty="0"/>
+              <a:t> (DEIS), </a:t>
+            </a:r>
+            <a:r>
+              <a:rPr lang="en-US" dirty="0" err="1"/>
+              <a:t>Ministerio</a:t>
+            </a:r>
+            <a:r>
+              <a:rPr lang="en-US" dirty="0"/>
+              <a:t> de </a:t>
+            </a:r>
+            <a:r>
+              <a:rPr lang="en-US" dirty="0" err="1"/>
+              <a:t>Salud</a:t>
+            </a:r>
+            <a:endParaRPr lang="en-US" dirty="0"/>
           </a:p>
         </p:txBody>
       </p:sp>
@@ -7492,7 +8663,7 @@
           <p:cNvPr id="2" name="Picture 1">
             <a:extLst>
               <a:ext uri="{FF2B5EF4-FFF2-40B4-BE49-F238E27FC236}">
-                <a16:creationId xmlns:a16="http://schemas.microsoft.com/office/drawing/2014/main" id="{295007A5-62C2-A945-856A-B7C50031EDE8}"/>
+                <a16:creationId xmlns:a16="http://schemas.microsoft.com/office/drawing/2014/main" id="{C789969D-3142-A743-B52C-5FEFE38D83BF}"/>
               </a:ext>
             </a:extLst>
           </p:cNvPr>
@@ -7509,8 +8680,8 @@
         </p:blipFill>
         <p:spPr>
           <a:xfrm>
-            <a:off x="2285474" y="712975"/>
-            <a:ext cx="7621052" cy="5656472"/>
+            <a:off x="2848070" y="1060898"/>
+            <a:ext cx="6495859" cy="5357024"/>
           </a:xfrm>
           <a:prstGeom prst="rect">
             <a:avLst/>
@@ -7520,7 +8691,7 @@
     </p:spTree>
     <p:extLst>
       <p:ext uri="{BB962C8B-B14F-4D97-AF65-F5344CB8AC3E}">
-        <p14:creationId xmlns:p14="http://schemas.microsoft.com/office/powerpoint/2010/main" val="2803636919"/>
+        <p14:creationId xmlns:p14="http://schemas.microsoft.com/office/powerpoint/2010/main" val="734548123"/>
       </p:ext>
     </p:extLst>
   </p:cSld>
@@ -7549,10 +8720,10 @@
       </p:grpSpPr>
       <p:sp>
         <p:nvSpPr>
-          <p:cNvPr id="6" name="TextBox 5">
-            <a:extLst>
-              <a:ext uri="{FF2B5EF4-FFF2-40B4-BE49-F238E27FC236}">
-                <a16:creationId xmlns:a16="http://schemas.microsoft.com/office/drawing/2014/main" id="{AB65407A-4582-004A-A45F-BD87B99ABAF2}"/>
+          <p:cNvPr id="4" name="TextBox 3">
+            <a:extLst>
+              <a:ext uri="{FF2B5EF4-FFF2-40B4-BE49-F238E27FC236}">
+                <a16:creationId xmlns:a16="http://schemas.microsoft.com/office/drawing/2014/main" id="{5BCAFE7A-E299-D14E-9413-EB5C984AF441}"/>
               </a:ext>
             </a:extLst>
           </p:cNvPr>
@@ -7561,179 +8732,56 @@
         </p:nvSpPr>
         <p:spPr>
           <a:xfrm>
-            <a:off x="188534" y="128200"/>
-            <a:ext cx="6068989" cy="1323439"/>
+            <a:off x="3621059" y="2846895"/>
+            <a:ext cx="4949881" cy="1015663"/>
           </a:xfrm>
           <a:prstGeom prst="rect">
             <a:avLst/>
           </a:prstGeom>
-          <a:solidFill>
-            <a:schemeClr val="bg1"/>
-          </a:solidFill>
+          <a:noFill/>
         </p:spPr>
         <p:txBody>
-          <a:bodyPr wrap="square" rtlCol="0">
+          <a:bodyPr wrap="none" rtlCol="0">
             <a:spAutoFit/>
           </a:bodyPr>
           <a:lstStyle/>
           <a:p>
-            <a:pPr algn="ctr"/>
-            <a:r>
-              <a:rPr lang="en-US" sz="3200" dirty="0"/>
-              <a:t>INCIDENCIA </a:t>
-            </a:r>
-          </a:p>
-          <a:p>
-            <a:pPr algn="ctr"/>
-            <a:r>
-              <a:rPr lang="en-US" sz="2400" dirty="0" err="1"/>
-              <a:t>Promedio</a:t>
-            </a:r>
-            <a:r>
-              <a:rPr lang="en-US" sz="2400" dirty="0"/>
-              <a:t> </a:t>
-            </a:r>
-            <a:r>
-              <a:rPr lang="en-US" sz="2400" dirty="0" err="1"/>
-              <a:t>casos</a:t>
-            </a:r>
-            <a:r>
-              <a:rPr lang="en-US" sz="2400" dirty="0"/>
-              <a:t> </a:t>
-            </a:r>
-            <a:r>
-              <a:rPr lang="en-US" sz="2400" dirty="0" err="1"/>
-              <a:t>confirmados</a:t>
-            </a:r>
-            <a:r>
-              <a:rPr lang="en-US" sz="2400" dirty="0"/>
-              <a:t> </a:t>
-            </a:r>
-            <a:r>
-              <a:rPr lang="en-US" sz="2400" dirty="0" err="1"/>
-              <a:t>diarios</a:t>
-            </a:r>
-            <a:r>
-              <a:rPr lang="en-US" sz="2400" dirty="0"/>
-              <a:t> </a:t>
-            </a:r>
-          </a:p>
-          <a:p>
-            <a:pPr algn="ctr"/>
-            <a:r>
-              <a:rPr lang="en-US" sz="2400" dirty="0"/>
-              <a:t>x 100 mil </a:t>
-            </a:r>
-            <a:r>
-              <a:rPr lang="en-US" sz="2400" dirty="0" err="1"/>
-              <a:t>habitantes</a:t>
-            </a:r>
-            <a:endParaRPr lang="en-US" sz="2400" dirty="0"/>
-          </a:p>
-        </p:txBody>
-      </p:sp>
-      <p:sp>
-        <p:nvSpPr>
-          <p:cNvPr id="11" name="TextBox 10">
-            <a:extLst>
-              <a:ext uri="{FF2B5EF4-FFF2-40B4-BE49-F238E27FC236}">
-                <a16:creationId xmlns:a16="http://schemas.microsoft.com/office/drawing/2014/main" id="{0AA3CF90-3BBE-F041-B74C-D680E845FFBE}"/>
-              </a:ext>
-            </a:extLst>
-          </p:cNvPr>
-          <p:cNvSpPr txBox="1"/>
-          <p:nvPr/>
-        </p:nvSpPr>
-        <p:spPr>
-          <a:xfrm>
-            <a:off x="6257523" y="128200"/>
-            <a:ext cx="5785995" cy="584775"/>
-          </a:xfrm>
-          <a:prstGeom prst="rect">
-            <a:avLst/>
-          </a:prstGeom>
-          <a:solidFill>
-            <a:schemeClr val="bg1"/>
-          </a:solidFill>
-        </p:spPr>
-        <p:txBody>
-          <a:bodyPr wrap="square" rtlCol="0">
-            <a:spAutoFit/>
-          </a:bodyPr>
-          <a:lstStyle/>
-          <a:p>
-            <a:pPr algn="ctr"/>
-            <a:r>
-              <a:rPr lang="en-US" sz="3200" dirty="0"/>
-              <a:t>TESTS PCR SEMANALES </a:t>
-            </a:r>
-          </a:p>
-        </p:txBody>
-      </p:sp>
-      <p:pic>
-        <p:nvPicPr>
-          <p:cNvPr id="4" name="Picture 3">
-            <a:extLst>
-              <a:ext uri="{FF2B5EF4-FFF2-40B4-BE49-F238E27FC236}">
-                <a16:creationId xmlns:a16="http://schemas.microsoft.com/office/drawing/2014/main" id="{D07D96FC-86A3-FF4E-8725-F0EE0718618C}"/>
-              </a:ext>
-            </a:extLst>
-          </p:cNvPr>
-          <p:cNvPicPr>
-            <a:picLocks noChangeAspect="1"/>
-          </p:cNvPicPr>
-          <p:nvPr/>
-        </p:nvPicPr>
-        <p:blipFill>
-          <a:blip r:embed="rId3"/>
-          <a:stretch>
-            <a:fillRect/>
-          </a:stretch>
-        </p:blipFill>
-        <p:spPr>
-          <a:xfrm>
-            <a:off x="151161" y="1600046"/>
-            <a:ext cx="5963621" cy="4443046"/>
-          </a:xfrm>
-          <a:prstGeom prst="rect">
-            <a:avLst/>
-          </a:prstGeom>
-        </p:spPr>
-      </p:pic>
-      <p:pic>
-        <p:nvPicPr>
-          <p:cNvPr id="5" name="Picture 4">
-            <a:extLst>
-              <a:ext uri="{FF2B5EF4-FFF2-40B4-BE49-F238E27FC236}">
-                <a16:creationId xmlns:a16="http://schemas.microsoft.com/office/drawing/2014/main" id="{70A81271-5FAE-944D-9C43-39873ECB20AD}"/>
-              </a:ext>
-            </a:extLst>
-          </p:cNvPr>
-          <p:cNvPicPr>
-            <a:picLocks noChangeAspect="1"/>
-          </p:cNvPicPr>
-          <p:nvPr/>
-        </p:nvPicPr>
-        <p:blipFill>
-          <a:blip r:embed="rId4"/>
-          <a:stretch>
-            <a:fillRect/>
-          </a:stretch>
-        </p:blipFill>
-        <p:spPr>
-          <a:xfrm>
-            <a:off x="6114782" y="1600046"/>
-            <a:ext cx="6047361" cy="4489938"/>
-          </a:xfrm>
-          <a:prstGeom prst="rect">
-            <a:avLst/>
-          </a:prstGeom>
-        </p:spPr>
-      </p:pic>
+            <a:r>
+              <a:rPr lang="en-US" sz="6000" dirty="0"/>
+              <a:t>CASOS &amp; TESTS</a:t>
+            </a:r>
+          </a:p>
+        </p:txBody>
+      </p:sp>
+      <p:sp>
+        <p:nvSpPr>
+          <p:cNvPr id="5" name="Title 4">
+            <a:extLst>
+              <a:ext uri="{FF2B5EF4-FFF2-40B4-BE49-F238E27FC236}">
+                <a16:creationId xmlns:a16="http://schemas.microsoft.com/office/drawing/2014/main" id="{5B465201-ED47-B64A-B505-4DDA25649C32}"/>
+              </a:ext>
+            </a:extLst>
+          </p:cNvPr>
+          <p:cNvSpPr>
+            <a:spLocks noGrp="1"/>
+          </p:cNvSpPr>
+          <p:nvPr>
+            <p:ph type="title"/>
+          </p:nvPr>
+        </p:nvSpPr>
+        <p:spPr/>
+        <p:txBody>
+          <a:bodyPr/>
+          <a:lstStyle/>
+          <a:p>
+            <a:endParaRPr lang="en-US"/>
+          </a:p>
+        </p:txBody>
+      </p:sp>
     </p:spTree>
     <p:extLst>
       <p:ext uri="{BB962C8B-B14F-4D97-AF65-F5344CB8AC3E}">
-        <p14:creationId xmlns:p14="http://schemas.microsoft.com/office/powerpoint/2010/main" val="2245086434"/>
+        <p14:creationId xmlns:p14="http://schemas.microsoft.com/office/powerpoint/2010/main" val="3304157546"/>
       </p:ext>
     </p:extLst>
   </p:cSld>

</xml_diff>